<commit_message>
update for les 07
</commit_message>
<xml_diff>
--- a/doc/advanced/slides/lesson_07.pptx
+++ b/doc/advanced/slides/lesson_07.pptx
@@ -220,7 +220,7 @@
           <a:p>
             <a:fld id="{9B5B52BA-3295-0343-9E28-A260A811DD10}" type="datetimeFigureOut">
               <a:rPr lang="en-US" smtClean="0"/>
-              <a:t>8/4/19</a:t>
+              <a:t>9/20/20</a:t>
             </a:fld>
             <a:endParaRPr lang="en-US"/>
           </a:p>
@@ -868,7 +868,7 @@
           <a:p>
             <a:fld id="{04F1D4A2-813C-F741-B481-C92B3A596030}" type="datetimeFigureOut">
               <a:rPr lang="en-US" smtClean="0"/>
-              <a:t>8/4/19</a:t>
+              <a:t>9/20/20</a:t>
             </a:fld>
             <a:endParaRPr lang="en-US"/>
           </a:p>
@@ -1036,7 +1036,7 @@
           <a:p>
             <a:fld id="{04F1D4A2-813C-F741-B481-C92B3A596030}" type="datetimeFigureOut">
               <a:rPr lang="en-US" smtClean="0"/>
-              <a:t>8/4/19</a:t>
+              <a:t>9/20/20</a:t>
             </a:fld>
             <a:endParaRPr lang="en-US"/>
           </a:p>
@@ -1214,7 +1214,7 @@
           <a:p>
             <a:fld id="{04F1D4A2-813C-F741-B481-C92B3A596030}" type="datetimeFigureOut">
               <a:rPr lang="en-US" smtClean="0"/>
-              <a:t>8/4/19</a:t>
+              <a:t>9/20/20</a:t>
             </a:fld>
             <a:endParaRPr lang="en-US"/>
           </a:p>
@@ -1393,7 +1393,7 @@
           <a:p>
             <a:fld id="{04F1D4A2-813C-F741-B481-C92B3A596030}" type="datetimeFigureOut">
               <a:rPr lang="en-US" smtClean="0"/>
-              <a:t>8/4/19</a:t>
+              <a:t>9/20/20</a:t>
             </a:fld>
             <a:endParaRPr lang="en-US"/>
           </a:p>
@@ -1638,7 +1638,7 @@
           <a:p>
             <a:fld id="{04F1D4A2-813C-F741-B481-C92B3A596030}" type="datetimeFigureOut">
               <a:rPr lang="en-US" smtClean="0"/>
-              <a:t>8/4/19</a:t>
+              <a:t>9/20/20</a:t>
             </a:fld>
             <a:endParaRPr lang="en-US"/>
           </a:p>
@@ -1867,7 +1867,7 @@
           <a:p>
             <a:fld id="{04F1D4A2-813C-F741-B481-C92B3A596030}" type="datetimeFigureOut">
               <a:rPr lang="en-US" smtClean="0"/>
-              <a:t>8/4/19</a:t>
+              <a:t>9/20/20</a:t>
             </a:fld>
             <a:endParaRPr lang="en-US"/>
           </a:p>
@@ -2231,7 +2231,7 @@
           <a:p>
             <a:fld id="{04F1D4A2-813C-F741-B481-C92B3A596030}" type="datetimeFigureOut">
               <a:rPr lang="en-US" smtClean="0"/>
-              <a:t>8/4/19</a:t>
+              <a:t>9/20/20</a:t>
             </a:fld>
             <a:endParaRPr lang="en-US"/>
           </a:p>
@@ -2348,7 +2348,7 @@
           <a:p>
             <a:fld id="{04F1D4A2-813C-F741-B481-C92B3A596030}" type="datetimeFigureOut">
               <a:rPr lang="en-US" smtClean="0"/>
-              <a:t>8/4/19</a:t>
+              <a:t>9/20/20</a:t>
             </a:fld>
             <a:endParaRPr lang="en-US"/>
           </a:p>
@@ -2443,7 +2443,7 @@
           <a:p>
             <a:fld id="{04F1D4A2-813C-F741-B481-C92B3A596030}" type="datetimeFigureOut">
               <a:rPr lang="en-US" smtClean="0"/>
-              <a:t>8/4/19</a:t>
+              <a:t>9/20/20</a:t>
             </a:fld>
             <a:endParaRPr lang="en-US"/>
           </a:p>
@@ -2718,7 +2718,7 @@
           <a:p>
             <a:fld id="{04F1D4A2-813C-F741-B481-C92B3A596030}" type="datetimeFigureOut">
               <a:rPr lang="en-US" smtClean="0"/>
-              <a:t>8/4/19</a:t>
+              <a:t>9/20/20</a:t>
             </a:fld>
             <a:endParaRPr lang="en-US"/>
           </a:p>
@@ -2970,7 +2970,7 @@
           <a:p>
             <a:fld id="{04F1D4A2-813C-F741-B481-C92B3A596030}" type="datetimeFigureOut">
               <a:rPr lang="en-US" smtClean="0"/>
-              <a:t>8/4/19</a:t>
+              <a:t>9/20/20</a:t>
             </a:fld>
             <a:endParaRPr lang="en-US"/>
           </a:p>
@@ -3181,7 +3181,7 @@
           <a:p>
             <a:fld id="{04F1D4A2-813C-F741-B481-C92B3A596030}" type="datetimeFigureOut">
               <a:rPr lang="en-US" smtClean="0"/>
-              <a:t>8/4/19</a:t>
+              <a:t>9/20/20</a:t>
             </a:fld>
             <a:endParaRPr lang="en-US"/>
           </a:p>
@@ -3734,25 +3734,6 @@
           </a:p>
         </p:txBody>
       </p:sp>
-      <p:sp>
-        <p:nvSpPr>
-          <p:cNvPr id="5" name="Text Placeholder 4"/>
-          <p:cNvSpPr>
-            <a:spLocks noGrp="1"/>
-          </p:cNvSpPr>
-          <p:nvPr>
-            <p:ph type="body" idx="1"/>
-          </p:nvPr>
-        </p:nvSpPr>
-        <p:spPr/>
-        <p:txBody>
-          <a:bodyPr/>
-          <a:lstStyle/>
-          <a:p>
-            <a:endParaRPr lang="en-US"/>
-          </a:p>
-        </p:txBody>
-      </p:sp>
     </p:spTree>
     <p:extLst>
       <p:ext uri="{BB962C8B-B14F-4D97-AF65-F5344CB8AC3E}">
@@ -7113,25 +7094,6 @@
           </a:p>
         </p:txBody>
       </p:sp>
-      <p:sp>
-        <p:nvSpPr>
-          <p:cNvPr id="5" name="Text Placeholder 4"/>
-          <p:cNvSpPr>
-            <a:spLocks noGrp="1"/>
-          </p:cNvSpPr>
-          <p:nvPr>
-            <p:ph type="body" idx="1"/>
-          </p:nvPr>
-        </p:nvSpPr>
-        <p:spPr/>
-        <p:txBody>
-          <a:bodyPr/>
-          <a:lstStyle/>
-          <a:p>
-            <a:endParaRPr lang="en-US"/>
-          </a:p>
-        </p:txBody>
-      </p:sp>
     </p:spTree>
     <p:extLst>
       <p:ext uri="{BB962C8B-B14F-4D97-AF65-F5344CB8AC3E}">
@@ -7352,7 +7314,7 @@
             </a:pPr>
             <a:r>
               <a:rPr lang="en-US" dirty="0"/>
-              <a:t>Google Trends, late 2018</a:t>
+              <a:t>Google Trends, late 2020</a:t>
             </a:r>
             <a:endParaRPr lang="en-US" i="1" dirty="0"/>
           </a:p>
@@ -7360,22 +7322,34 @@
       </p:sp>
       <p:pic>
         <p:nvPicPr>
-          <p:cNvPr id="2" name="Picture 1"/>
+          <p:cNvPr id="6" name="Picture 5">
+            <a:extLst>
+              <a:ext uri="{FF2B5EF4-FFF2-40B4-BE49-F238E27FC236}">
+                <a16:creationId xmlns:a16="http://schemas.microsoft.com/office/drawing/2014/main" id="{F7080C8E-5241-FF41-8D51-B8785F62B2F5}"/>
+              </a:ext>
+            </a:extLst>
+          </p:cNvPr>
           <p:cNvPicPr>
             <a:picLocks noChangeAspect="1"/>
           </p:cNvPicPr>
           <p:nvPr/>
         </p:nvPicPr>
         <p:blipFill>
-          <a:blip r:embed="rId3"/>
+          <a:blip r:embed="rId3">
+            <a:extLst>
+              <a:ext uri="{28A0092B-C50C-407E-A947-70E740481C1C}">
+                <a14:useLocalDpi xmlns:a14="http://schemas.microsoft.com/office/drawing/2010/main" val="0"/>
+              </a:ext>
+            </a:extLst>
+          </a:blip>
           <a:stretch>
             <a:fillRect/>
           </a:stretch>
         </p:blipFill>
         <p:spPr>
           <a:xfrm>
-            <a:off x="1054443" y="1765875"/>
-            <a:ext cx="9835979" cy="4995259"/>
+            <a:off x="667512" y="1690689"/>
+            <a:ext cx="9979152" cy="5091404"/>
           </a:xfrm>
           <a:prstGeom prst="rect">
             <a:avLst/>

</xml_diff>